<commit_message>
small fixes to lectures #7 and #8
</commit_message>
<xml_diff>
--- a/classes/stats2016/Lecture07.pptx
+++ b/classes/stats2016/Lecture07.pptx
@@ -245,7 +245,7 @@
             <a:fld id="{EED6FE97-C8F6-414A-BAD9-185DD18CF7E9}" type="datetimeFigureOut">
               <a:rPr lang="en-US" smtClean="0"/>
               <a:pPr/>
-              <a:t>2/7/2016</a:t>
+              <a:t>2/9/2016</a:t>
             </a:fld>
             <a:endParaRPr lang="en-US"/>
           </a:p>
@@ -3917,7 +3917,7 @@
             <a:fld id="{1D8BD707-D9CF-40AE-B4C6-C98DA3205C09}" type="datetimeFigureOut">
               <a:rPr lang="en-US" smtClean="0"/>
               <a:pPr/>
-              <a:t>2/7/2016</a:t>
+              <a:t>2/9/2016</a:t>
             </a:fld>
             <a:endParaRPr lang="en-US"/>
           </a:p>
@@ -4084,7 +4084,7 @@
             <a:fld id="{1D8BD707-D9CF-40AE-B4C6-C98DA3205C09}" type="datetimeFigureOut">
               <a:rPr lang="en-US" smtClean="0"/>
               <a:pPr/>
-              <a:t>2/7/2016</a:t>
+              <a:t>2/9/2016</a:t>
             </a:fld>
             <a:endParaRPr lang="en-US"/>
           </a:p>
@@ -4261,7 +4261,7 @@
             <a:fld id="{1D8BD707-D9CF-40AE-B4C6-C98DA3205C09}" type="datetimeFigureOut">
               <a:rPr lang="en-US" smtClean="0"/>
               <a:pPr/>
-              <a:t>2/7/2016</a:t>
+              <a:t>2/9/2016</a:t>
             </a:fld>
             <a:endParaRPr lang="en-US"/>
           </a:p>
@@ -4428,7 +4428,7 @@
             <a:fld id="{1D8BD707-D9CF-40AE-B4C6-C98DA3205C09}" type="datetimeFigureOut">
               <a:rPr lang="en-US" smtClean="0"/>
               <a:pPr/>
-              <a:t>2/7/2016</a:t>
+              <a:t>2/9/2016</a:t>
             </a:fld>
             <a:endParaRPr lang="en-US"/>
           </a:p>
@@ -4671,7 +4671,7 @@
             <a:fld id="{1D8BD707-D9CF-40AE-B4C6-C98DA3205C09}" type="datetimeFigureOut">
               <a:rPr lang="en-US" smtClean="0"/>
               <a:pPr/>
-              <a:t>2/7/2016</a:t>
+              <a:t>2/9/2016</a:t>
             </a:fld>
             <a:endParaRPr lang="en-US"/>
           </a:p>
@@ -4956,7 +4956,7 @@
             <a:fld id="{1D8BD707-D9CF-40AE-B4C6-C98DA3205C09}" type="datetimeFigureOut">
               <a:rPr lang="en-US" smtClean="0"/>
               <a:pPr/>
-              <a:t>2/7/2016</a:t>
+              <a:t>2/9/2016</a:t>
             </a:fld>
             <a:endParaRPr lang="en-US"/>
           </a:p>
@@ -5375,7 +5375,7 @@
             <a:fld id="{1D8BD707-D9CF-40AE-B4C6-C98DA3205C09}" type="datetimeFigureOut">
               <a:rPr lang="en-US" smtClean="0"/>
               <a:pPr/>
-              <a:t>2/7/2016</a:t>
+              <a:t>2/9/2016</a:t>
             </a:fld>
             <a:endParaRPr lang="en-US"/>
           </a:p>
@@ -5490,7 +5490,7 @@
             <a:fld id="{1D8BD707-D9CF-40AE-B4C6-C98DA3205C09}" type="datetimeFigureOut">
               <a:rPr lang="en-US" smtClean="0"/>
               <a:pPr/>
-              <a:t>2/7/2016</a:t>
+              <a:t>2/9/2016</a:t>
             </a:fld>
             <a:endParaRPr lang="en-US"/>
           </a:p>
@@ -5582,7 +5582,7 @@
             <a:fld id="{1D8BD707-D9CF-40AE-B4C6-C98DA3205C09}" type="datetimeFigureOut">
               <a:rPr lang="en-US" smtClean="0"/>
               <a:pPr/>
-              <a:t>2/7/2016</a:t>
+              <a:t>2/9/2016</a:t>
             </a:fld>
             <a:endParaRPr lang="en-US"/>
           </a:p>
@@ -5856,7 +5856,7 @@
             <a:fld id="{1D8BD707-D9CF-40AE-B4C6-C98DA3205C09}" type="datetimeFigureOut">
               <a:rPr lang="en-US" smtClean="0"/>
               <a:pPr/>
-              <a:t>2/7/2016</a:t>
+              <a:t>2/9/2016</a:t>
             </a:fld>
             <a:endParaRPr lang="en-US"/>
           </a:p>
@@ -6106,7 +6106,7 @@
             <a:fld id="{1D8BD707-D9CF-40AE-B4C6-C98DA3205C09}" type="datetimeFigureOut">
               <a:rPr lang="en-US" smtClean="0"/>
               <a:pPr/>
-              <a:t>2/7/2016</a:t>
+              <a:t>2/9/2016</a:t>
             </a:fld>
             <a:endParaRPr lang="en-US"/>
           </a:p>
@@ -6316,7 +6316,7 @@
             <a:fld id="{1D8BD707-D9CF-40AE-B4C6-C98DA3205C09}" type="datetimeFigureOut">
               <a:rPr lang="en-US" smtClean="0"/>
               <a:pPr/>
-              <a:t>2/7/2016</a:t>
+              <a:t>2/9/2016</a:t>
             </a:fld>
             <a:endParaRPr lang="en-US"/>
           </a:p>
@@ -7482,15 +7482,7 @@
           <a:p>
             <a:r>
               <a:rPr lang="en-US" dirty="0" smtClean="0"/>
-              <a:t>An example of the </a:t>
-            </a:r>
-            <a:r>
-              <a:rPr lang="en-US" dirty="0" smtClean="0"/>
-              <a:t>hypergeometric </a:t>
-            </a:r>
-            <a:r>
-              <a:rPr lang="en-US" dirty="0" smtClean="0"/>
-              <a:t>distribution from the genomics literature:</a:t>
+              <a:t>An example of the hypergeometric distribution from the genomics literature:</a:t>
             </a:r>
           </a:p>
           <a:p>
@@ -10508,7 +10500,7 @@
         <p:spPr>
           <a:xfrm>
             <a:off x="76200" y="6019800"/>
-            <a:ext cx="9218806" cy="646331"/>
+            <a:ext cx="9173793" cy="615553"/>
           </a:xfrm>
           <a:prstGeom prst="rect">
             <a:avLst/>
@@ -10528,10 +10520,10 @@
           </a:p>
           <a:p>
             <a:r>
-              <a:rPr lang="en-US" dirty="0" smtClean="0"/>
-              <a:t>http://www.the-idea-shop.com/article/216/deriving-the-poisson-distribution-from-the-binomial</a:t>
-            </a:r>
-            <a:endParaRPr lang="en-US" dirty="0"/>
+              <a:rPr lang="en-US" sz="1600" dirty="0"/>
+              <a:t>https://probabilityandstats.wordpress.com/2011/08/18/poisson-as-a-limiting-case-of-binomial-distribution/</a:t>
+            </a:r>
+            <a:endParaRPr lang="en-US" sz="1600" dirty="0"/>
           </a:p>
         </p:txBody>
       </p:sp>
@@ -12614,7 +12606,7 @@
           <a:graphicData uri="http://schemas.openxmlformats.org/presentationml/2006/ole">
             <mc:AlternateContent xmlns:mc="http://schemas.openxmlformats.org/markup-compatibility/2006">
               <mc:Choice xmlns:v="urn:schemas-microsoft-com:vml" Requires="v">
-                <p:oleObj spid="_x0000_s2051" name="Equation" r:id="rId5" imgW="749160" imgH="457200" progId="Equation.3">
+                <p:oleObj spid="_x0000_s2052" name="Equation" r:id="rId5" imgW="749160" imgH="457200" progId="Equation.3">
                   <p:embed/>
                 </p:oleObj>
               </mc:Choice>

</xml_diff>